<commit_message>
last changes and presentation
</commit_message>
<xml_diff>
--- a/ODAF-Nicolas-Sandller.pptx
+++ b/ODAF-Nicolas-Sandller.pptx
@@ -3087,7 +3087,7 @@
       </p:grpSpPr>
       <p:sp>
         <p:nvSpPr>
-          <p:cNvPr id="152" name="Shape 152"/>
+          <p:cNvPr id="153" name="Shape 153"/>
           <p:cNvSpPr/>
           <p:nvPr>
             <p:ph type="title"/>
@@ -3111,7 +3111,7 @@
       </p:sp>
       <p:sp>
         <p:nvSpPr>
-          <p:cNvPr id="153" name="Shape 153"/>
+          <p:cNvPr id="154" name="Shape 154"/>
           <p:cNvSpPr/>
           <p:nvPr>
             <p:ph type="body" idx="1"/>
@@ -3119,8 +3119,8 @@
         </p:nvSpPr>
         <p:spPr>
           <a:xfrm>
-            <a:off x="952499" y="3339856"/>
-            <a:ext cx="11099801" cy="6286501"/>
+            <a:off x="952500" y="3339856"/>
+            <a:ext cx="11099800" cy="6286501"/>
           </a:xfrm>
           <a:prstGeom prst="rect">
             <a:avLst/>
@@ -3291,7 +3291,7 @@
       </p:grpSpPr>
       <p:sp>
         <p:nvSpPr>
-          <p:cNvPr id="155" name="Shape 155"/>
+          <p:cNvPr id="156" name="Shape 156"/>
           <p:cNvSpPr/>
           <p:nvPr>
             <p:ph type="title"/>
@@ -3341,7 +3341,7 @@
       </p:grpSpPr>
       <p:sp>
         <p:nvSpPr>
-          <p:cNvPr id="157" name="Shape 157"/>
+          <p:cNvPr id="158" name="Shape 158"/>
           <p:cNvSpPr/>
           <p:nvPr>
             <p:ph type="title"/>
@@ -3373,7 +3373,7 @@
       </p:sp>
       <p:sp>
         <p:nvSpPr>
-          <p:cNvPr id="158" name="Shape 158"/>
+          <p:cNvPr id="159" name="Shape 159"/>
           <p:cNvSpPr/>
           <p:nvPr>
             <p:ph type="body" sz="half" idx="1"/>
@@ -3659,7 +3659,7 @@
       </p:sp>
       <p:sp>
         <p:nvSpPr>
-          <p:cNvPr id="159" name="Shape 159"/>
+          <p:cNvPr id="160" name="Shape 160"/>
           <p:cNvSpPr/>
           <p:nvPr/>
         </p:nvSpPr>
@@ -3920,7 +3920,7 @@
       </p:grpSpPr>
       <p:sp>
         <p:nvSpPr>
-          <p:cNvPr id="161" name="Shape 161"/>
+          <p:cNvPr id="162" name="Shape 162"/>
           <p:cNvSpPr/>
           <p:nvPr>
             <p:ph type="title"/>
@@ -3962,7 +3962,7 @@
       </p:sp>
       <p:sp>
         <p:nvSpPr>
-          <p:cNvPr id="162" name="Shape 162"/>
+          <p:cNvPr id="163" name="Shape 163"/>
           <p:cNvSpPr/>
           <p:nvPr>
             <p:ph type="body" sz="half" idx="1"/>
@@ -4235,7 +4235,7 @@
       </p:sp>
       <p:sp>
         <p:nvSpPr>
-          <p:cNvPr id="163" name="Shape 163"/>
+          <p:cNvPr id="164" name="Shape 164"/>
           <p:cNvSpPr/>
           <p:nvPr/>
         </p:nvSpPr>
@@ -4650,7 +4650,7 @@
       </p:grpSpPr>
       <p:sp>
         <p:nvSpPr>
-          <p:cNvPr id="165" name="Shape 165"/>
+          <p:cNvPr id="166" name="Shape 166"/>
           <p:cNvSpPr/>
           <p:nvPr>
             <p:ph type="title"/>
@@ -4682,7 +4682,7 @@
       </p:sp>
       <p:sp>
         <p:nvSpPr>
-          <p:cNvPr id="166" name="Shape 166"/>
+          <p:cNvPr id="167" name="Shape 167"/>
           <p:cNvSpPr/>
           <p:nvPr>
             <p:ph type="body" sz="half" idx="1"/>
@@ -4959,7 +4959,7 @@
       </p:sp>
       <p:sp>
         <p:nvSpPr>
-          <p:cNvPr id="167" name="Shape 167"/>
+          <p:cNvPr id="168" name="Shape 168"/>
           <p:cNvSpPr/>
           <p:nvPr/>
         </p:nvSpPr>
@@ -5182,7 +5182,7 @@
       </p:grpSpPr>
       <p:sp>
         <p:nvSpPr>
-          <p:cNvPr id="169" name="Shape 169"/>
+          <p:cNvPr id="170" name="Shape 170"/>
           <p:cNvSpPr/>
           <p:nvPr>
             <p:ph type="title"/>
@@ -5216,7 +5216,7 @@
       </p:sp>
       <p:sp>
         <p:nvSpPr>
-          <p:cNvPr id="170" name="Shape 170"/>
+          <p:cNvPr id="171" name="Shape 171"/>
           <p:cNvSpPr/>
           <p:nvPr>
             <p:ph type="body" sz="half" idx="1"/>
@@ -5659,7 +5659,7 @@
       </p:sp>
       <p:sp>
         <p:nvSpPr>
-          <p:cNvPr id="171" name="Shape 171"/>
+          <p:cNvPr id="172" name="Shape 172"/>
           <p:cNvSpPr/>
           <p:nvPr/>
         </p:nvSpPr>
@@ -6074,7 +6074,7 @@
       </p:grpSpPr>
       <p:sp>
         <p:nvSpPr>
-          <p:cNvPr id="173" name="Shape 173"/>
+          <p:cNvPr id="174" name="Shape 174"/>
           <p:cNvSpPr/>
           <p:nvPr>
             <p:ph type="title"/>
@@ -6106,7 +6106,7 @@
       </p:sp>
       <p:sp>
         <p:nvSpPr>
-          <p:cNvPr id="174" name="Shape 174"/>
+          <p:cNvPr id="175" name="Shape 175"/>
           <p:cNvSpPr/>
           <p:nvPr>
             <p:ph type="body" sz="half" idx="1"/>
@@ -6830,7 +6830,7 @@
       </p:sp>
       <p:sp>
         <p:nvSpPr>
-          <p:cNvPr id="175" name="Shape 175"/>
+          <p:cNvPr id="176" name="Shape 176"/>
           <p:cNvSpPr/>
           <p:nvPr/>
         </p:nvSpPr>
@@ -7289,7 +7289,7 @@
       </p:grpSpPr>
       <p:sp>
         <p:nvSpPr>
-          <p:cNvPr id="177" name="Shape 177"/>
+          <p:cNvPr id="178" name="Shape 178"/>
           <p:cNvSpPr/>
           <p:nvPr>
             <p:ph type="title"/>
@@ -7347,7 +7347,7 @@
       </p:grpSpPr>
       <p:sp>
         <p:nvSpPr>
-          <p:cNvPr id="179" name="Shape 179"/>
+          <p:cNvPr id="180" name="Shape 180"/>
           <p:cNvSpPr/>
           <p:nvPr/>
         </p:nvSpPr>
@@ -7387,7 +7387,7 @@
       </p:sp>
       <p:pic>
         <p:nvPicPr>
-          <p:cNvPr id="180" name="1.gif"/>
+          <p:cNvPr id="181" name="1.gif"/>
           <p:cNvPicPr>
             <a:picLocks noChangeAspect="0"/>
           </p:cNvPicPr>
@@ -7442,7 +7442,7 @@
       </p:grpSpPr>
       <p:sp>
         <p:nvSpPr>
-          <p:cNvPr id="182" name="Shape 182"/>
+          <p:cNvPr id="183" name="Shape 183"/>
           <p:cNvSpPr/>
           <p:nvPr/>
         </p:nvSpPr>
@@ -7482,7 +7482,7 @@
       </p:sp>
       <p:pic>
         <p:nvPicPr>
-          <p:cNvPr id="183" name="2.gif"/>
+          <p:cNvPr id="184" name="2.gif"/>
           <p:cNvPicPr>
             <a:picLocks noChangeAspect="0"/>
           </p:cNvPicPr>
@@ -7587,7 +7587,7 @@
       </p:grpSpPr>
       <p:pic>
         <p:nvPicPr>
-          <p:cNvPr id="185" name="prueba.gif"/>
+          <p:cNvPr id="186" name="prueba.gif"/>
           <p:cNvPicPr>
             <a:picLocks noChangeAspect="0"/>
           </p:cNvPicPr>
@@ -7616,7 +7616,7 @@
       </p:pic>
       <p:sp>
         <p:nvSpPr>
-          <p:cNvPr id="186" name="Shape 186"/>
+          <p:cNvPr id="187" name="Shape 187"/>
           <p:cNvSpPr/>
           <p:nvPr/>
         </p:nvSpPr>
@@ -7682,7 +7682,7 @@
       </p:grpSpPr>
       <p:sp>
         <p:nvSpPr>
-          <p:cNvPr id="188" name="Shape 188"/>
+          <p:cNvPr id="189" name="Shape 189"/>
           <p:cNvSpPr/>
           <p:nvPr/>
         </p:nvSpPr>
@@ -7722,7 +7722,7 @@
       </p:sp>
       <p:pic>
         <p:nvPicPr>
-          <p:cNvPr id="189" name="4.gif"/>
+          <p:cNvPr id="190" name="4.gif"/>
           <p:cNvPicPr>
             <a:picLocks noChangeAspect="0"/>
           </p:cNvPicPr>
@@ -7777,7 +7777,7 @@
       </p:grpSpPr>
       <p:sp>
         <p:nvSpPr>
-          <p:cNvPr id="191" name="Shape 191"/>
+          <p:cNvPr id="192" name="Shape 192"/>
           <p:cNvSpPr/>
           <p:nvPr>
             <p:ph type="title"/>
@@ -7801,7 +7801,7 @@
       </p:sp>
       <p:sp>
         <p:nvSpPr>
-          <p:cNvPr id="192" name="Shape 192"/>
+          <p:cNvPr id="193" name="Shape 193"/>
           <p:cNvSpPr/>
           <p:nvPr>
             <p:ph type="body" idx="1"/>
@@ -9046,7 +9046,7 @@
               <a:defRPr sz="2200"/>
             </a:pPr>
             <a:r>
-              <a:t>Re - expresamos en forma matricial:</a:t>
+              <a:t>Re - expresamos en forma matricial:  </a:t>
             </a:r>
           </a:p>
           <a:p>
@@ -9142,67 +9142,9 @@
           </a:p>
         </p:txBody>
       </p:sp>
-      <p:pic>
-        <p:nvPicPr>
-          <p:cNvPr id="134" name="Screen Shot 2015-12-09 at 10.45.11 AM.png"/>
-          <p:cNvPicPr>
-            <a:picLocks noChangeAspect="1"/>
-          </p:cNvPicPr>
-          <p:nvPr/>
-        </p:nvPicPr>
-        <p:blipFill>
-          <a:blip r:embed="rId2">
-            <a:extLst/>
-          </a:blip>
-          <a:stretch>
-            <a:fillRect/>
-          </a:stretch>
-        </p:blipFill>
-        <p:spPr>
-          <a:xfrm>
-            <a:off x="3298295" y="2162524"/>
-            <a:ext cx="6408210" cy="1927405"/>
-          </a:xfrm>
-          <a:prstGeom prst="rect">
-            <a:avLst/>
-          </a:prstGeom>
-          <a:ln w="12700">
-            <a:miter lim="400000"/>
-          </a:ln>
-        </p:spPr>
-      </p:pic>
-      <p:pic>
-        <p:nvPicPr>
-          <p:cNvPr id="135" name="Screen Shot 2015-12-09 at 10.50.26 AM.png"/>
-          <p:cNvPicPr>
-            <a:picLocks noChangeAspect="1"/>
-          </p:cNvPicPr>
-          <p:nvPr/>
-        </p:nvPicPr>
-        <p:blipFill>
-          <a:blip r:embed="rId3">
-            <a:extLst/>
-          </a:blip>
-          <a:stretch>
-            <a:fillRect/>
-          </a:stretch>
-        </p:blipFill>
-        <p:spPr>
-          <a:xfrm>
-            <a:off x="223184" y="5906958"/>
-            <a:ext cx="6408209" cy="2339991"/>
-          </a:xfrm>
-          <a:prstGeom prst="rect">
-            <a:avLst/>
-          </a:prstGeom>
-          <a:ln w="12700">
-            <a:miter lim="400000"/>
-          </a:ln>
-        </p:spPr>
-      </p:pic>
       <p:sp>
         <p:nvSpPr>
-          <p:cNvPr id="136" name="Shape 136"/>
+          <p:cNvPr id="134" name="Shape 134"/>
           <p:cNvSpPr/>
           <p:nvPr/>
         </p:nvSpPr>
@@ -9350,6 +9292,93 @@
           </a:p>
         </p:txBody>
       </p:sp>
+      <p:pic>
+        <p:nvPicPr>
+          <p:cNvPr id="135" name="Screen Shot 2015-12-10 at 11.05.00 AM.png"/>
+          <p:cNvPicPr>
+            <a:picLocks noChangeAspect="1"/>
+          </p:cNvPicPr>
+          <p:nvPr/>
+        </p:nvPicPr>
+        <p:blipFill>
+          <a:blip r:embed="rId2">
+            <a:extLst/>
+          </a:blip>
+          <a:stretch>
+            <a:fillRect/>
+          </a:stretch>
+        </p:blipFill>
+        <p:spPr>
+          <a:xfrm>
+            <a:off x="2389451" y="2199243"/>
+            <a:ext cx="7649029" cy="1796916"/>
+          </a:xfrm>
+          <a:prstGeom prst="rect">
+            <a:avLst/>
+          </a:prstGeom>
+          <a:ln w="12700">
+            <a:miter lim="400000"/>
+          </a:ln>
+        </p:spPr>
+      </p:pic>
+      <p:pic>
+        <p:nvPicPr>
+          <p:cNvPr id="136" name="Screen Shot 2015-12-10 at 11.58.59 AM.png"/>
+          <p:cNvPicPr>
+            <a:picLocks noChangeAspect="1"/>
+          </p:cNvPicPr>
+          <p:nvPr/>
+        </p:nvPicPr>
+        <p:blipFill>
+          <a:blip r:embed="rId3">
+            <a:extLst/>
+          </a:blip>
+          <a:stretch>
+            <a:fillRect/>
+          </a:stretch>
+        </p:blipFill>
+        <p:spPr>
+          <a:xfrm>
+            <a:off x="1466686" y="5013539"/>
+            <a:ext cx="2889944" cy="1240881"/>
+          </a:xfrm>
+          <a:prstGeom prst="rect">
+            <a:avLst/>
+          </a:prstGeom>
+          <a:ln w="12700">
+            <a:miter lim="400000"/>
+          </a:ln>
+        </p:spPr>
+      </p:pic>
+      <p:pic>
+        <p:nvPicPr>
+          <p:cNvPr id="137" name="Screen Shot 2015-12-10 at 11.59.14 AM.png"/>
+          <p:cNvPicPr>
+            <a:picLocks noChangeAspect="1"/>
+          </p:cNvPicPr>
+          <p:nvPr/>
+        </p:nvPicPr>
+        <p:blipFill>
+          <a:blip r:embed="rId4">
+            <a:extLst/>
+          </a:blip>
+          <a:stretch>
+            <a:fillRect/>
+          </a:stretch>
+        </p:blipFill>
+        <p:spPr>
+          <a:xfrm>
+            <a:off x="294216" y="6143726"/>
+            <a:ext cx="7076557" cy="2414894"/>
+          </a:xfrm>
+          <a:prstGeom prst="rect">
+            <a:avLst/>
+          </a:prstGeom>
+          <a:ln w="12700">
+            <a:miter lim="400000"/>
+          </a:ln>
+        </p:spPr>
+      </p:pic>
     </p:spTree>
   </p:cSld>
   <p:clrMapOvr>
@@ -9378,7 +9407,7 @@
       </p:grpSpPr>
       <p:sp>
         <p:nvSpPr>
-          <p:cNvPr id="138" name="Shape 138"/>
+          <p:cNvPr id="139" name="Shape 139"/>
           <p:cNvSpPr/>
           <p:nvPr/>
         </p:nvSpPr>
@@ -9567,7 +9596,7 @@
       </p:sp>
       <p:pic>
         <p:nvPicPr>
-          <p:cNvPr id="139" name="Screen Shot 2015-12-09 at 11.39.00 AM.png"/>
+          <p:cNvPr id="140" name="Screen Shot 2015-12-09 at 11.42.40 AM.png"/>
           <p:cNvPicPr>
             <a:picLocks noChangeAspect="1"/>
           </p:cNvPicPr>
@@ -9575,64 +9604,6 @@
         </p:nvPicPr>
         <p:blipFill>
           <a:blip r:embed="rId2">
-            <a:extLst/>
-          </a:blip>
-          <a:stretch>
-            <a:fillRect/>
-          </a:stretch>
-        </p:blipFill>
-        <p:spPr>
-          <a:xfrm>
-            <a:off x="3201389" y="2123299"/>
-            <a:ext cx="5410201" cy="1270001"/>
-          </a:xfrm>
-          <a:prstGeom prst="rect">
-            <a:avLst/>
-          </a:prstGeom>
-          <a:ln w="12700">
-            <a:miter lim="400000"/>
-          </a:ln>
-        </p:spPr>
-      </p:pic>
-      <p:pic>
-        <p:nvPicPr>
-          <p:cNvPr id="140" name="Screen Shot 2015-12-09 at 11.41.22 AM.png"/>
-          <p:cNvPicPr>
-            <a:picLocks noChangeAspect="1"/>
-          </p:cNvPicPr>
-          <p:nvPr/>
-        </p:nvPicPr>
-        <p:blipFill>
-          <a:blip r:embed="rId3">
-            <a:extLst/>
-          </a:blip>
-          <a:stretch>
-            <a:fillRect/>
-          </a:stretch>
-        </p:blipFill>
-        <p:spPr>
-          <a:xfrm>
-            <a:off x="1433489" y="4431779"/>
-            <a:ext cx="9321801" cy="1270001"/>
-          </a:xfrm>
-          <a:prstGeom prst="rect">
-            <a:avLst/>
-          </a:prstGeom>
-          <a:ln w="12700">
-            <a:miter lim="400000"/>
-          </a:ln>
-        </p:spPr>
-      </p:pic>
-      <p:pic>
-        <p:nvPicPr>
-          <p:cNvPr id="141" name="Screen Shot 2015-12-09 at 11.42.40 AM.png"/>
-          <p:cNvPicPr>
-            <a:picLocks noChangeAspect="1"/>
-          </p:cNvPicPr>
-          <p:nvPr/>
-        </p:nvPicPr>
-        <p:blipFill>
-          <a:blip r:embed="rId4">
             <a:extLst/>
           </a:blip>
           <a:stretch>
@@ -9654,7 +9625,65 @@
       </p:pic>
       <p:pic>
         <p:nvPicPr>
-          <p:cNvPr id="142" name="Screen Shot 2015-12-09 at 11.42.45 AM.png"/>
+          <p:cNvPr id="141" name="Screen Shot 2015-12-09 at 11.42.45 AM.png"/>
+          <p:cNvPicPr>
+            <a:picLocks noChangeAspect="1"/>
+          </p:cNvPicPr>
+          <p:nvPr/>
+        </p:nvPicPr>
+        <p:blipFill>
+          <a:blip r:embed="rId3">
+            <a:extLst/>
+          </a:blip>
+          <a:stretch>
+            <a:fillRect/>
+          </a:stretch>
+        </p:blipFill>
+        <p:spPr>
+          <a:xfrm>
+            <a:off x="6361157" y="6224878"/>
+            <a:ext cx="3645504" cy="3218554"/>
+          </a:xfrm>
+          <a:prstGeom prst="rect">
+            <a:avLst/>
+          </a:prstGeom>
+          <a:ln w="12700">
+            <a:miter lim="400000"/>
+          </a:ln>
+        </p:spPr>
+      </p:pic>
+      <p:pic>
+        <p:nvPicPr>
+          <p:cNvPr id="142" name="Screen Shot 2015-12-10 at 6.30.28 PM.png"/>
+          <p:cNvPicPr>
+            <a:picLocks noChangeAspect="1"/>
+          </p:cNvPicPr>
+          <p:nvPr/>
+        </p:nvPicPr>
+        <p:blipFill>
+          <a:blip r:embed="rId4">
+            <a:extLst/>
+          </a:blip>
+          <a:stretch>
+            <a:fillRect/>
+          </a:stretch>
+        </p:blipFill>
+        <p:spPr>
+          <a:xfrm>
+            <a:off x="3796863" y="2088592"/>
+            <a:ext cx="5411074" cy="1820089"/>
+          </a:xfrm>
+          <a:prstGeom prst="rect">
+            <a:avLst/>
+          </a:prstGeom>
+          <a:ln w="12700">
+            <a:miter lim="400000"/>
+          </a:ln>
+        </p:spPr>
+      </p:pic>
+      <p:pic>
+        <p:nvPicPr>
+          <p:cNvPr id="143" name="Screen Shot 2015-12-10 at 6.45.27 PM.png"/>
           <p:cNvPicPr>
             <a:picLocks noChangeAspect="1"/>
           </p:cNvPicPr>
@@ -9670,8 +9699,8 @@
         </p:blipFill>
         <p:spPr>
           <a:xfrm>
-            <a:off x="6361157" y="6224878"/>
-            <a:ext cx="3645504" cy="3218554"/>
+            <a:off x="3019104" y="3843205"/>
+            <a:ext cx="6966592" cy="2067190"/>
           </a:xfrm>
           <a:prstGeom prst="rect">
             <a:avLst/>
@@ -9707,221 +9736,6 @@
           <a:chExt cx="0" cy="0"/>
         </a:xfrm>
       </p:grpSpPr>
-      <p:sp>
-        <p:nvSpPr>
-          <p:cNvPr id="144" name="Shape 144"/>
-          <p:cNvSpPr/>
-          <p:nvPr/>
-        </p:nvSpPr>
-        <p:spPr>
-          <a:xfrm>
-            <a:off x="732782" y="665306"/>
-            <a:ext cx="11099801" cy="8422987"/>
-          </a:xfrm>
-          <a:prstGeom prst="rect">
-            <a:avLst/>
-          </a:prstGeom>
-          <a:ln w="12700">
-            <a:miter lim="400000"/>
-          </a:ln>
-          <a:extLst>
-            <a:ext uri="{C572A759-6A51-4108-AA02-DFA0A04FC94B}">
-              <ma14:wrappingTextBoxFlag xmlns:ma14="http://schemas.microsoft.com/office/mac/drawingml/2011/main" val="1"/>
-            </a:ext>
-          </a:extLst>
-        </p:spPr>
-        <p:txBody>
-          <a:bodyPr lIns="50800" tIns="50800" rIns="50800" bIns="50800" anchor="ctr">
-            <a:normAutofit fontScale="100000" lnSpcReduction="0"/>
-          </a:bodyPr>
-          <a:lstStyle/>
-          <a:p>
-            <a:pPr algn="l" defTabSz="457200">
-              <a:lnSpc>
-                <a:spcPts val="4400"/>
-              </a:lnSpc>
-              <a:spcBef>
-                <a:spcPts val="1200"/>
-              </a:spcBef>
-              <a:defRPr sz="2200"/>
-            </a:pPr>
-            <a:r>
-              <a:t>Para encontrar las raíces del sistema buscamos los autovalores:</a:t>
-            </a:r>
-          </a:p>
-          <a:p>
-            <a:pPr algn="l" defTabSz="457200">
-              <a:lnSpc>
-                <a:spcPts val="4400"/>
-              </a:lnSpc>
-              <a:spcBef>
-                <a:spcPts val="1200"/>
-              </a:spcBef>
-              <a:defRPr sz="2200"/>
-            </a:pPr>
-          </a:p>
-          <a:p>
-            <a:pPr algn="l" defTabSz="457200">
-              <a:lnSpc>
-                <a:spcPts val="4400"/>
-              </a:lnSpc>
-              <a:spcBef>
-                <a:spcPts val="1200"/>
-              </a:spcBef>
-              <a:defRPr sz="2200"/>
-            </a:pPr>
-          </a:p>
-          <a:p>
-            <a:pPr algn="l" defTabSz="457200">
-              <a:lnSpc>
-                <a:spcPts val="4400"/>
-              </a:lnSpc>
-              <a:spcBef>
-                <a:spcPts val="1200"/>
-              </a:spcBef>
-              <a:defRPr sz="2200"/>
-            </a:pPr>
-          </a:p>
-          <a:p>
-            <a:pPr algn="l" defTabSz="457200">
-              <a:lnSpc>
-                <a:spcPts val="4400"/>
-              </a:lnSpc>
-              <a:spcBef>
-                <a:spcPts val="1200"/>
-              </a:spcBef>
-              <a:defRPr sz="2200"/>
-            </a:pPr>
-          </a:p>
-          <a:p>
-            <a:pPr algn="l" defTabSz="457200">
-              <a:lnSpc>
-                <a:spcPts val="4400"/>
-              </a:lnSpc>
-              <a:spcBef>
-                <a:spcPts val="1200"/>
-              </a:spcBef>
-              <a:defRPr sz="2200"/>
-            </a:pPr>
-          </a:p>
-          <a:p>
-            <a:pPr algn="l" defTabSz="457200">
-              <a:lnSpc>
-                <a:spcPts val="4400"/>
-              </a:lnSpc>
-              <a:spcBef>
-                <a:spcPts val="1200"/>
-              </a:spcBef>
-              <a:defRPr sz="2200"/>
-            </a:pPr>
-            <a:r>
-              <a:t>Donde:</a:t>
-            </a:r>
-          </a:p>
-          <a:p>
-            <a:pPr algn="l" defTabSz="457200">
-              <a:lnSpc>
-                <a:spcPts val="4400"/>
-              </a:lnSpc>
-              <a:spcBef>
-                <a:spcPts val="1200"/>
-              </a:spcBef>
-              <a:defRPr sz="2200"/>
-            </a:pPr>
-          </a:p>
-          <a:p>
-            <a:pPr algn="l" defTabSz="457200">
-              <a:lnSpc>
-                <a:spcPts val="4400"/>
-              </a:lnSpc>
-              <a:spcBef>
-                <a:spcPts val="1200"/>
-              </a:spcBef>
-              <a:defRPr sz="2200"/>
-            </a:pPr>
-          </a:p>
-          <a:p>
-            <a:pPr lvl="8" algn="l" defTabSz="457200">
-              <a:lnSpc>
-                <a:spcPts val="4400"/>
-              </a:lnSpc>
-              <a:spcBef>
-                <a:spcPts val="1200"/>
-              </a:spcBef>
-              <a:defRPr sz="2200"/>
-            </a:pPr>
-          </a:p>
-          <a:p>
-            <a:pPr lvl="8" algn="l" defTabSz="457200">
-              <a:lnSpc>
-                <a:spcPts val="4400"/>
-              </a:lnSpc>
-              <a:spcBef>
-                <a:spcPts val="1200"/>
-              </a:spcBef>
-              <a:defRPr sz="2200"/>
-            </a:pPr>
-          </a:p>
-          <a:p>
-            <a:pPr lvl="8" algn="l" defTabSz="457200">
-              <a:lnSpc>
-                <a:spcPts val="4400"/>
-              </a:lnSpc>
-              <a:spcBef>
-                <a:spcPts val="1200"/>
-              </a:spcBef>
-              <a:defRPr sz="2200"/>
-            </a:pPr>
-          </a:p>
-          <a:p>
-            <a:pPr lvl="8" algn="l" defTabSz="457200">
-              <a:lnSpc>
-                <a:spcPts val="4400"/>
-              </a:lnSpc>
-              <a:spcBef>
-                <a:spcPts val="1200"/>
-              </a:spcBef>
-              <a:defRPr sz="2200"/>
-            </a:pPr>
-          </a:p>
-          <a:p>
-            <a:pPr lvl="7" algn="l" defTabSz="457200">
-              <a:lnSpc>
-                <a:spcPts val="4400"/>
-              </a:lnSpc>
-              <a:spcBef>
-                <a:spcPts val="1200"/>
-              </a:spcBef>
-              <a:defRPr sz="2200"/>
-            </a:pPr>
-          </a:p>
-          <a:p>
-            <a:pPr lvl="7" algn="l" defTabSz="457200">
-              <a:lnSpc>
-                <a:spcPts val="4400"/>
-              </a:lnSpc>
-              <a:spcBef>
-                <a:spcPts val="1200"/>
-              </a:spcBef>
-              <a:defRPr sz="2200"/>
-            </a:pPr>
-          </a:p>
-          <a:p>
-            <a:pPr algn="l" defTabSz="457200">
-              <a:lnSpc>
-                <a:spcPts val="4400"/>
-              </a:lnSpc>
-              <a:spcBef>
-                <a:spcPts val="1200"/>
-              </a:spcBef>
-              <a:defRPr sz="2200"/>
-            </a:pPr>
-            <a:r>
-              <a:t>Vemos que el punto de equilibrio es un punto de silla con una raíz inestable.</a:t>
-            </a:r>
-          </a:p>
-        </p:txBody>
-      </p:sp>
       <p:pic>
         <p:nvPicPr>
           <p:cNvPr id="145" name="Screen Shot 2015-12-09 at 10.55.06 AM.png"/>
@@ -9940,8 +9754,8 @@
         </p:blipFill>
         <p:spPr>
           <a:xfrm>
-            <a:off x="2881453" y="1617521"/>
-            <a:ext cx="6802460" cy="1984051"/>
+            <a:off x="2302984" y="1278854"/>
+            <a:ext cx="8398832" cy="2449660"/>
           </a:xfrm>
           <a:prstGeom prst="rect">
             <a:avLst/>
@@ -9953,7 +9767,7 @@
       </p:pic>
       <p:pic>
         <p:nvPicPr>
-          <p:cNvPr id="146" name="Screen Shot 2015-12-09 at 10.55.36 AM.png"/>
+          <p:cNvPr id="146" name="Screen Shot 2015-12-10 at 12.15.29 PM.png"/>
           <p:cNvPicPr>
             <a:picLocks noChangeAspect="1"/>
           </p:cNvPicPr>
@@ -9969,8 +9783,8 @@
         </p:blipFill>
         <p:spPr>
           <a:xfrm>
-            <a:off x="2813304" y="4330446"/>
-            <a:ext cx="5777466" cy="2967877"/>
+            <a:off x="3238500" y="4887118"/>
+            <a:ext cx="6527801" cy="3352801"/>
           </a:xfrm>
           <a:prstGeom prst="rect">
             <a:avLst/>
@@ -9980,6 +9794,177 @@
           </a:ln>
         </p:spPr>
       </p:pic>
+      <p:sp>
+        <p:nvSpPr>
+          <p:cNvPr id="147" name="Shape 147"/>
+          <p:cNvSpPr/>
+          <p:nvPr/>
+        </p:nvSpPr>
+        <p:spPr>
+          <a:xfrm>
+            <a:off x="1256986" y="658749"/>
+            <a:ext cx="9648826" cy="8436102"/>
+          </a:xfrm>
+          <a:prstGeom prst="rect">
+            <a:avLst/>
+          </a:prstGeom>
+          <a:ln w="12700">
+            <a:miter lim="400000"/>
+          </a:ln>
+          <a:extLst>
+            <a:ext uri="{C572A759-6A51-4108-AA02-DFA0A04FC94B}">
+              <ma14:wrappingTextBoxFlag xmlns:ma14="http://schemas.microsoft.com/office/mac/drawingml/2011/main" val="1"/>
+            </a:ext>
+          </a:extLst>
+        </p:spPr>
+        <p:txBody>
+          <a:bodyPr wrap="none" lIns="50800" tIns="50800" rIns="50800" bIns="50800" anchor="ctr">
+            <a:spAutoFit/>
+          </a:bodyPr>
+          <a:lstStyle/>
+          <a:p>
+            <a:pPr algn="l" defTabSz="457200">
+              <a:lnSpc>
+                <a:spcPts val="4400"/>
+              </a:lnSpc>
+              <a:spcBef>
+                <a:spcPts val="1200"/>
+              </a:spcBef>
+              <a:defRPr sz="2200"/>
+            </a:pPr>
+            <a:r>
+              <a:t>Para encontrar las raíces del sistema buscamos los autovalores:</a:t>
+            </a:r>
+          </a:p>
+          <a:p>
+            <a:pPr algn="l" defTabSz="457200">
+              <a:lnSpc>
+                <a:spcPts val="4400"/>
+              </a:lnSpc>
+              <a:spcBef>
+                <a:spcPts val="1200"/>
+              </a:spcBef>
+              <a:defRPr sz="2200"/>
+            </a:pPr>
+          </a:p>
+          <a:p>
+            <a:pPr algn="l" defTabSz="457200">
+              <a:lnSpc>
+                <a:spcPts val="4400"/>
+              </a:lnSpc>
+              <a:spcBef>
+                <a:spcPts val="1200"/>
+              </a:spcBef>
+              <a:defRPr sz="2200"/>
+            </a:pPr>
+          </a:p>
+          <a:p>
+            <a:pPr algn="l" defTabSz="457200">
+              <a:lnSpc>
+                <a:spcPts val="4400"/>
+              </a:lnSpc>
+              <a:spcBef>
+                <a:spcPts val="1200"/>
+              </a:spcBef>
+              <a:defRPr sz="2200"/>
+            </a:pPr>
+          </a:p>
+          <a:p>
+            <a:pPr algn="l" defTabSz="457200">
+              <a:lnSpc>
+                <a:spcPts val="4400"/>
+              </a:lnSpc>
+              <a:spcBef>
+                <a:spcPts val="1200"/>
+              </a:spcBef>
+              <a:defRPr sz="2200"/>
+            </a:pPr>
+          </a:p>
+          <a:p>
+            <a:pPr algn="l" defTabSz="457200">
+              <a:lnSpc>
+                <a:spcPts val="4400"/>
+              </a:lnSpc>
+              <a:spcBef>
+                <a:spcPts val="1200"/>
+              </a:spcBef>
+              <a:defRPr sz="2200"/>
+            </a:pPr>
+            <a:r>
+              <a:t>Donde:</a:t>
+            </a:r>
+          </a:p>
+          <a:p>
+            <a:pPr lvl="7" algn="l" defTabSz="457200">
+              <a:lnSpc>
+                <a:spcPts val="4400"/>
+              </a:lnSpc>
+              <a:spcBef>
+                <a:spcPts val="1200"/>
+              </a:spcBef>
+              <a:defRPr sz="2200"/>
+            </a:pPr>
+          </a:p>
+          <a:p>
+            <a:pPr lvl="7" algn="l" defTabSz="457200">
+              <a:lnSpc>
+                <a:spcPts val="4400"/>
+              </a:lnSpc>
+              <a:spcBef>
+                <a:spcPts val="1200"/>
+              </a:spcBef>
+              <a:defRPr sz="2200"/>
+            </a:pPr>
+          </a:p>
+          <a:p>
+            <a:pPr lvl="7" algn="l" defTabSz="457200">
+              <a:lnSpc>
+                <a:spcPts val="4400"/>
+              </a:lnSpc>
+              <a:spcBef>
+                <a:spcPts val="1200"/>
+              </a:spcBef>
+              <a:defRPr sz="2200"/>
+            </a:pPr>
+          </a:p>
+          <a:p>
+            <a:pPr algn="l" defTabSz="457200">
+              <a:lnSpc>
+                <a:spcPts val="4400"/>
+              </a:lnSpc>
+              <a:spcBef>
+                <a:spcPts val="1200"/>
+              </a:spcBef>
+              <a:defRPr sz="2200"/>
+            </a:pPr>
+          </a:p>
+          <a:p>
+            <a:pPr algn="l" defTabSz="457200">
+              <a:lnSpc>
+                <a:spcPts val="4400"/>
+              </a:lnSpc>
+              <a:spcBef>
+                <a:spcPts val="1200"/>
+              </a:spcBef>
+              <a:defRPr sz="2200"/>
+            </a:pPr>
+          </a:p>
+          <a:p>
+            <a:pPr algn="l" defTabSz="457200">
+              <a:lnSpc>
+                <a:spcPts val="4400"/>
+              </a:lnSpc>
+              <a:spcBef>
+                <a:spcPts val="1200"/>
+              </a:spcBef>
+              <a:defRPr sz="2200"/>
+            </a:pPr>
+            <a:r>
+              <a:t>Vemos que el punto de equilibrio es un punto de silla con una raíz inestable.</a:t>
+            </a:r>
+          </a:p>
+        </p:txBody>
+      </p:sp>
     </p:spTree>
   </p:cSld>
   <p:clrMapOvr>
@@ -10008,7 +9993,7 @@
       </p:grpSpPr>
       <p:sp>
         <p:nvSpPr>
-          <p:cNvPr id="148" name="Shape 148"/>
+          <p:cNvPr id="149" name="Shape 149"/>
           <p:cNvSpPr/>
           <p:nvPr/>
         </p:nvSpPr>
@@ -10156,7 +10141,7 @@
       </p:sp>
       <p:pic>
         <p:nvPicPr>
-          <p:cNvPr id="149" name="Screen Shot 2015-12-09 at 11.45.46 AM.png"/>
+          <p:cNvPr id="150" name="Screen Shot 2015-12-09 at 11.45.46 AM.png"/>
           <p:cNvPicPr>
             <a:picLocks noChangeAspect="1"/>
           </p:cNvPicPr>
@@ -10185,7 +10170,7 @@
       </p:pic>
       <p:pic>
         <p:nvPicPr>
-          <p:cNvPr id="150" name="Screen Shot 2015-12-09 at 11.45.39 AM.png"/>
+          <p:cNvPr id="151" name="Screen Shot 2015-12-09 at 11.45.39 AM.png"/>
           <p:cNvPicPr>
             <a:picLocks noChangeAspect="1"/>
           </p:cNvPicPr>

</xml_diff>